<commit_message>
edits to spp rich and light/temp analyses
</commit_message>
<xml_diff>
--- a/Output/surfgrasspca.pptx
+++ b/Output/surfgrasspca.pptx
@@ -260,7 +260,7 @@
           <a:p>
             <a:fld id="{CA410B4E-7D17-734D-A9E6-F036B5CECA49}" type="datetimeFigureOut">
               <a:rPr lang="en-US" smtClean="0"/>
-              <a:t>12/6/20</a:t>
+              <a:t>12/19/20</a:t>
             </a:fld>
             <a:endParaRPr lang="en-US"/>
           </a:p>
@@ -458,7 +458,7 @@
           <a:p>
             <a:fld id="{CA410B4E-7D17-734D-A9E6-F036B5CECA49}" type="datetimeFigureOut">
               <a:rPr lang="en-US" smtClean="0"/>
-              <a:t>12/6/20</a:t>
+              <a:t>12/19/20</a:t>
             </a:fld>
             <a:endParaRPr lang="en-US"/>
           </a:p>
@@ -666,7 +666,7 @@
           <a:p>
             <a:fld id="{CA410B4E-7D17-734D-A9E6-F036B5CECA49}" type="datetimeFigureOut">
               <a:rPr lang="en-US" smtClean="0"/>
-              <a:t>12/6/20</a:t>
+              <a:t>12/19/20</a:t>
             </a:fld>
             <a:endParaRPr lang="en-US"/>
           </a:p>
@@ -864,7 +864,7 @@
           <a:p>
             <a:fld id="{CA410B4E-7D17-734D-A9E6-F036B5CECA49}" type="datetimeFigureOut">
               <a:rPr lang="en-US" smtClean="0"/>
-              <a:t>12/6/20</a:t>
+              <a:t>12/19/20</a:t>
             </a:fld>
             <a:endParaRPr lang="en-US"/>
           </a:p>
@@ -1139,7 +1139,7 @@
           <a:p>
             <a:fld id="{CA410B4E-7D17-734D-A9E6-F036B5CECA49}" type="datetimeFigureOut">
               <a:rPr lang="en-US" smtClean="0"/>
-              <a:t>12/6/20</a:t>
+              <a:t>12/19/20</a:t>
             </a:fld>
             <a:endParaRPr lang="en-US"/>
           </a:p>
@@ -1404,7 +1404,7 @@
           <a:p>
             <a:fld id="{CA410B4E-7D17-734D-A9E6-F036B5CECA49}" type="datetimeFigureOut">
               <a:rPr lang="en-US" smtClean="0"/>
-              <a:t>12/6/20</a:t>
+              <a:t>12/19/20</a:t>
             </a:fld>
             <a:endParaRPr lang="en-US"/>
           </a:p>
@@ -1816,7 +1816,7 @@
           <a:p>
             <a:fld id="{CA410B4E-7D17-734D-A9E6-F036B5CECA49}" type="datetimeFigureOut">
               <a:rPr lang="en-US" smtClean="0"/>
-              <a:t>12/6/20</a:t>
+              <a:t>12/19/20</a:t>
             </a:fld>
             <a:endParaRPr lang="en-US"/>
           </a:p>
@@ -1957,7 +1957,7 @@
           <a:p>
             <a:fld id="{CA410B4E-7D17-734D-A9E6-F036B5CECA49}" type="datetimeFigureOut">
               <a:rPr lang="en-US" smtClean="0"/>
-              <a:t>12/6/20</a:t>
+              <a:t>12/19/20</a:t>
             </a:fld>
             <a:endParaRPr lang="en-US"/>
           </a:p>
@@ -2070,7 +2070,7 @@
           <a:p>
             <a:fld id="{CA410B4E-7D17-734D-A9E6-F036B5CECA49}" type="datetimeFigureOut">
               <a:rPr lang="en-US" smtClean="0"/>
-              <a:t>12/6/20</a:t>
+              <a:t>12/19/20</a:t>
             </a:fld>
             <a:endParaRPr lang="en-US"/>
           </a:p>
@@ -2381,7 +2381,7 @@
           <a:p>
             <a:fld id="{CA410B4E-7D17-734D-A9E6-F036B5CECA49}" type="datetimeFigureOut">
               <a:rPr lang="en-US" smtClean="0"/>
-              <a:t>12/6/20</a:t>
+              <a:t>12/19/20</a:t>
             </a:fld>
             <a:endParaRPr lang="en-US"/>
           </a:p>
@@ -2669,7 +2669,7 @@
           <a:p>
             <a:fld id="{CA410B4E-7D17-734D-A9E6-F036B5CECA49}" type="datetimeFigureOut">
               <a:rPr lang="en-US" smtClean="0"/>
-              <a:t>12/6/20</a:t>
+              <a:t>12/19/20</a:t>
             </a:fld>
             <a:endParaRPr lang="en-US"/>
           </a:p>
@@ -2910,7 +2910,7 @@
           <a:p>
             <a:fld id="{CA410B4E-7D17-734D-A9E6-F036B5CECA49}" type="datetimeFigureOut">
               <a:rPr lang="en-US" smtClean="0"/>
-              <a:t>12/6/20</a:t>
+              <a:t>12/19/20</a:t>
             </a:fld>
             <a:endParaRPr lang="en-US"/>
           </a:p>
@@ -4020,8 +4020,8 @@
         </p:nvSpPr>
         <p:spPr>
           <a:xfrm>
-            <a:off x="7530353" y="5071926"/>
-            <a:ext cx="2247731" cy="1938992"/>
+            <a:off x="4172921" y="5810577"/>
+            <a:ext cx="6858000" cy="1477328"/>
           </a:xfrm>
           <a:prstGeom prst="rect">
             <a:avLst/>
@@ -4029,19 +4029,10 @@
           <a:noFill/>
         </p:spPr>
         <p:txBody>
-          <a:bodyPr wrap="none" rtlCol="0">
+          <a:bodyPr wrap="square" numCol="3" rtlCol="0">
             <a:spAutoFit/>
           </a:bodyPr>
           <a:lstStyle/>
-          <a:p>
-            <a:pPr algn="ctr"/>
-            <a:r>
-              <a:rPr lang="en-US" sz="3000" u="sng" dirty="0">
-                <a:latin typeface="Helvetica" pitchFamily="2" charset="0"/>
-              </a:rPr>
-              <a:t>Shape color</a:t>
-            </a:r>
-          </a:p>
           <a:p>
             <a:r>
               <a:rPr lang="en-US" sz="3000" b="1" dirty="0">
@@ -4054,6 +4045,22 @@
             </a:r>
           </a:p>
           <a:p>
+            <a:endParaRPr lang="en-US" sz="3000" b="1" dirty="0">
+              <a:solidFill>
+                <a:srgbClr val="67A9CF"/>
+              </a:solidFill>
+              <a:latin typeface="Helvetica" pitchFamily="2" charset="0"/>
+            </a:endParaRPr>
+          </a:p>
+          <a:p>
+            <a:endParaRPr lang="en-US" sz="3000" b="1" dirty="0">
+              <a:solidFill>
+                <a:srgbClr val="67A9CF"/>
+              </a:solidFill>
+              <a:latin typeface="Helvetica" pitchFamily="2" charset="0"/>
+            </a:endParaRPr>
+          </a:p>
+          <a:p>
             <a:r>
               <a:rPr lang="en-US" sz="3000" b="1" dirty="0">
                 <a:solidFill>
@@ -4063,6 +4070,22 @@
               </a:rPr>
               <a:t>Herbivores</a:t>
             </a:r>
+          </a:p>
+          <a:p>
+            <a:endParaRPr lang="en-US" sz="3000" b="1" dirty="0">
+              <a:solidFill>
+                <a:srgbClr val="156C58"/>
+              </a:solidFill>
+              <a:latin typeface="Helvetica" pitchFamily="2" charset="0"/>
+            </a:endParaRPr>
+          </a:p>
+          <a:p>
+            <a:endParaRPr lang="en-US" sz="3000" b="1" dirty="0">
+              <a:solidFill>
+                <a:srgbClr val="156C58"/>
+              </a:solidFill>
+              <a:latin typeface="Helvetica" pitchFamily="2" charset="0"/>
+            </a:endParaRPr>
           </a:p>
           <a:p>
             <a:r>
@@ -4099,7 +4122,7 @@
         </p:blipFill>
         <p:spPr>
           <a:xfrm>
-            <a:off x="5277024" y="5840098"/>
+            <a:off x="180223" y="4455051"/>
             <a:ext cx="863600" cy="520700"/>
           </a:xfrm>
           <a:prstGeom prst="rect">
@@ -4107,255 +4130,256 @@
           </a:prstGeom>
         </p:spPr>
       </p:pic>
-      <p:grpSp>
-        <p:nvGrpSpPr>
-          <p:cNvPr id="15" name="Group 14">
-            <a:extLst>
-              <a:ext uri="{FF2B5EF4-FFF2-40B4-BE49-F238E27FC236}">
-                <a16:creationId xmlns:a16="http://schemas.microsoft.com/office/drawing/2014/main" id="{302B4871-FCCD-D441-9CE6-F14D67036EF8}"/>
-              </a:ext>
-            </a:extLst>
-          </p:cNvPr>
-          <p:cNvGrpSpPr/>
+      <p:sp>
+        <p:nvSpPr>
+          <p:cNvPr id="6" name="TextBox 5">
+            <a:extLst>
+              <a:ext uri="{FF2B5EF4-FFF2-40B4-BE49-F238E27FC236}">
+                <a16:creationId xmlns:a16="http://schemas.microsoft.com/office/drawing/2014/main" id="{2DC32575-486A-764E-96BD-66AD48B481B5}"/>
+              </a:ext>
+            </a:extLst>
+          </p:cNvPr>
+          <p:cNvSpPr txBox="1"/>
           <p:nvPr/>
-        </p:nvGrpSpPr>
-        <p:grpSpPr>
+        </p:nvSpPr>
+        <p:spPr>
           <a:xfrm>
-            <a:off x="861392" y="133233"/>
-            <a:ext cx="10558463" cy="5269478"/>
-            <a:chOff x="861392" y="133233"/>
-            <a:chExt cx="10558463" cy="5269478"/>
+            <a:off x="358023" y="1277345"/>
+            <a:ext cx="12936071" cy="4708981"/>
           </a:xfrm>
-        </p:grpSpPr>
-        <p:sp>
-          <p:nvSpPr>
-            <p:cNvPr id="6" name="TextBox 5">
-              <a:extLst>
-                <a:ext uri="{FF2B5EF4-FFF2-40B4-BE49-F238E27FC236}">
-                  <a16:creationId xmlns:a16="http://schemas.microsoft.com/office/drawing/2014/main" id="{2DC32575-486A-764E-96BD-66AD48B481B5}"/>
-                </a:ext>
-              </a:extLst>
-            </p:cNvPr>
-            <p:cNvSpPr txBox="1"/>
-            <p:nvPr/>
-          </p:nvSpPr>
-          <p:spPr>
-            <a:xfrm>
-              <a:off x="861392" y="693730"/>
-              <a:ext cx="10558463" cy="4708981"/>
-            </a:xfrm>
-            <a:prstGeom prst="rect">
-              <a:avLst/>
-            </a:prstGeom>
-            <a:noFill/>
-          </p:spPr>
-          <p:txBody>
-            <a:bodyPr wrap="square" numCol="2" rtlCol="0">
-              <a:spAutoFit/>
-            </a:bodyPr>
-            <a:lstStyle/>
-            <a:p>
-              <a:r>
-                <a:rPr lang="en-US" sz="3000" b="1" dirty="0">
-                  <a:solidFill>
-                    <a:srgbClr val="6BAED6"/>
-                  </a:solidFill>
-                  <a:latin typeface="Helvetica" pitchFamily="2" charset="0"/>
-                </a:rPr>
-                <a:t>Microalgae</a:t>
-              </a:r>
-            </a:p>
-            <a:p>
-              <a:r>
-                <a:rPr lang="en-US" sz="3000" b="1" dirty="0">
-                  <a:solidFill>
-                    <a:srgbClr val="C7EAC0"/>
-                  </a:solidFill>
-                  <a:latin typeface="Helvetica" pitchFamily="2" charset="0"/>
-                </a:rPr>
-                <a:t>Filamentous</a:t>
-              </a:r>
-            </a:p>
-            <a:p>
-              <a:r>
-                <a:rPr lang="en-US" sz="3000" b="1" dirty="0">
-                  <a:solidFill>
-                    <a:srgbClr val="A1D99B"/>
-                  </a:solidFill>
-                  <a:latin typeface="Helvetica" pitchFamily="2" charset="0"/>
-                </a:rPr>
-                <a:t>Foliose</a:t>
-              </a:r>
-            </a:p>
-            <a:p>
-              <a:r>
-                <a:rPr lang="en-US" sz="3000" b="1" dirty="0">
-                  <a:solidFill>
-                    <a:srgbClr val="31A454"/>
-                  </a:solidFill>
-                  <a:latin typeface="Helvetica" pitchFamily="2" charset="0"/>
-                </a:rPr>
-                <a:t>Corticated foliose</a:t>
-              </a:r>
-            </a:p>
-            <a:p>
-              <a:r>
-                <a:rPr lang="en-US" sz="3000" b="1" dirty="0">
-                  <a:solidFill>
-                    <a:srgbClr val="A50F14"/>
-                  </a:solidFill>
-                  <a:latin typeface="Helvetica" pitchFamily="2" charset="0"/>
-                </a:rPr>
-                <a:t>Corticated macroalgae</a:t>
-              </a:r>
-              <a:endParaRPr lang="en-US" sz="3000" b="1" dirty="0">
+          <a:prstGeom prst="rect">
+            <a:avLst/>
+          </a:prstGeom>
+          <a:noFill/>
+        </p:spPr>
+        <p:txBody>
+          <a:bodyPr wrap="square" numCol="3" rtlCol="0">
+            <a:spAutoFit/>
+          </a:bodyPr>
+          <a:lstStyle/>
+          <a:p>
+            <a:r>
+              <a:rPr lang="en-US" sz="3000" b="1" dirty="0">
+                <a:solidFill>
+                  <a:srgbClr val="6BAED6"/>
+                </a:solidFill>
+                <a:latin typeface="Helvetica" pitchFamily="2" charset="0"/>
+              </a:rPr>
+              <a:t>Microalgae</a:t>
+            </a:r>
+          </a:p>
+          <a:p>
+            <a:r>
+              <a:rPr lang="en-US" sz="3000" b="1" dirty="0">
+                <a:solidFill>
+                  <a:srgbClr val="C7EAC0"/>
+                </a:solidFill>
+                <a:latin typeface="Helvetica" pitchFamily="2" charset="0"/>
+              </a:rPr>
+              <a:t>Filamentous</a:t>
+            </a:r>
+          </a:p>
+          <a:p>
+            <a:r>
+              <a:rPr lang="en-US" sz="3000" b="1" dirty="0">
+                <a:solidFill>
+                  <a:srgbClr val="A1D99B"/>
+                </a:solidFill>
+                <a:latin typeface="Helvetica" pitchFamily="2" charset="0"/>
+              </a:rPr>
+              <a:t>Foliose</a:t>
+            </a:r>
+          </a:p>
+          <a:p>
+            <a:endParaRPr lang="en-US" sz="3000" b="1" dirty="0">
+              <a:solidFill>
+                <a:srgbClr val="31A454"/>
+              </a:solidFill>
+              <a:latin typeface="Helvetica" pitchFamily="2" charset="0"/>
+            </a:endParaRPr>
+          </a:p>
+          <a:p>
+            <a:endParaRPr lang="en-US" sz="3000" b="1" dirty="0">
+              <a:solidFill>
+                <a:srgbClr val="31A454"/>
+              </a:solidFill>
+              <a:latin typeface="Helvetica" pitchFamily="2" charset="0"/>
+            </a:endParaRPr>
+          </a:p>
+          <a:p>
+            <a:endParaRPr lang="en-US" sz="3000" b="1" dirty="0">
+              <a:solidFill>
+                <a:srgbClr val="31A454"/>
+              </a:solidFill>
+              <a:latin typeface="Helvetica" pitchFamily="2" charset="0"/>
+            </a:endParaRPr>
+          </a:p>
+          <a:p>
+            <a:endParaRPr lang="en-US" sz="3000" b="1" dirty="0">
+              <a:solidFill>
+                <a:srgbClr val="31A454"/>
+              </a:solidFill>
+              <a:latin typeface="Helvetica" pitchFamily="2" charset="0"/>
+            </a:endParaRPr>
+          </a:p>
+          <a:p>
+            <a:endParaRPr lang="en-US" sz="3000" b="1" dirty="0">
+              <a:solidFill>
+                <a:srgbClr val="31A454"/>
+              </a:solidFill>
+              <a:latin typeface="Helvetica" pitchFamily="2" charset="0"/>
+            </a:endParaRPr>
+          </a:p>
+          <a:p>
+            <a:endParaRPr lang="en-US" sz="3000" b="1" dirty="0">
+              <a:solidFill>
+                <a:srgbClr val="31A454"/>
+              </a:solidFill>
+              <a:latin typeface="Helvetica" pitchFamily="2" charset="0"/>
+            </a:endParaRPr>
+          </a:p>
+          <a:p>
+            <a:endParaRPr lang="en-US" sz="3000" b="1" dirty="0">
+              <a:solidFill>
+                <a:srgbClr val="31A454"/>
+              </a:solidFill>
+              <a:latin typeface="Helvetica" pitchFamily="2" charset="0"/>
+            </a:endParaRPr>
+          </a:p>
+          <a:p>
+            <a:r>
+              <a:rPr lang="en-US" sz="3000" b="1" dirty="0">
+                <a:solidFill>
+                  <a:srgbClr val="31A454"/>
+                </a:solidFill>
+                <a:latin typeface="Helvetica" pitchFamily="2" charset="0"/>
+              </a:rPr>
+              <a:t>Corticated foliose</a:t>
+            </a:r>
+          </a:p>
+          <a:p>
+            <a:r>
+              <a:rPr lang="en-US" sz="3000" b="1" dirty="0">
+                <a:solidFill>
+                  <a:srgbClr val="A50F14"/>
+                </a:solidFill>
+                <a:latin typeface="Helvetica" pitchFamily="2" charset="0"/>
+              </a:rPr>
+              <a:t>Corticated macroalgae</a:t>
+            </a:r>
+            <a:endParaRPr lang="en-US" sz="3000" b="1" dirty="0">
+              <a:solidFill>
+                <a:srgbClr val="156D2B"/>
+              </a:solidFill>
+              <a:latin typeface="Helvetica" pitchFamily="2" charset="0"/>
+            </a:endParaRPr>
+          </a:p>
+          <a:p>
+            <a:r>
+              <a:rPr lang="en-US" sz="3000" b="1" dirty="0">
                 <a:solidFill>
                   <a:srgbClr val="156D2B"/>
                 </a:solidFill>
                 <a:latin typeface="Helvetica" pitchFamily="2" charset="0"/>
-              </a:endParaRPr>
-            </a:p>
-            <a:p>
-              <a:endParaRPr lang="en-US" sz="3000" b="1" dirty="0">
+              </a:rPr>
+              <a:t>Leathery macrophytes</a:t>
+            </a:r>
+          </a:p>
+          <a:p>
+            <a:r>
+              <a:rPr lang="en-US" sz="3000" b="1" dirty="0">
                 <a:solidFill>
-                  <a:srgbClr val="156D2B"/>
+                  <a:srgbClr val="C51A8A"/>
                 </a:solidFill>
                 <a:latin typeface="Helvetica" pitchFamily="2" charset="0"/>
-              </a:endParaRPr>
-            </a:p>
-            <a:p>
-              <a:endParaRPr lang="en-US" sz="3000" b="1" dirty="0">
+              </a:rPr>
+              <a:t>Articulated corallines</a:t>
+            </a:r>
+            <a:endParaRPr lang="en-US" sz="3000" b="1" dirty="0">
+              <a:solidFill>
+                <a:srgbClr val="D4B9DA"/>
+              </a:solidFill>
+              <a:latin typeface="Helvetica" pitchFamily="2" charset="0"/>
+            </a:endParaRPr>
+          </a:p>
+          <a:p>
+            <a:r>
+              <a:rPr lang="en-US" sz="3000" b="1" dirty="0">
                 <a:solidFill>
-                  <a:srgbClr val="156D2B"/>
+                  <a:srgbClr val="D4B9DA"/>
                 </a:solidFill>
                 <a:latin typeface="Helvetica" pitchFamily="2" charset="0"/>
-              </a:endParaRPr>
-            </a:p>
-            <a:p>
-              <a:endParaRPr lang="en-US" sz="3000" b="1" dirty="0">
+              </a:rPr>
+              <a:t>Crustose</a:t>
+            </a:r>
+            <a:endParaRPr lang="en-US" sz="3000" b="1" dirty="0">
+              <a:solidFill>
+                <a:srgbClr val="156D2B"/>
+              </a:solidFill>
+              <a:latin typeface="Helvetica" pitchFamily="2" charset="0"/>
+            </a:endParaRPr>
+          </a:p>
+          <a:p>
+            <a:r>
+              <a:rPr lang="en-US" sz="3000" b="1" dirty="0">
                 <a:solidFill>
-                  <a:srgbClr val="156D2B"/>
+                  <a:srgbClr val="54268F"/>
                 </a:solidFill>
                 <a:latin typeface="Helvetica" pitchFamily="2" charset="0"/>
-              </a:endParaRPr>
-            </a:p>
-            <a:p>
-              <a:endParaRPr lang="en-US" sz="3000" b="1" dirty="0">
+              </a:rPr>
+              <a:t>Anemones</a:t>
+            </a:r>
+          </a:p>
+          <a:p>
+            <a:r>
+              <a:rPr lang="en-US" sz="3000" b="1" dirty="0">
                 <a:solidFill>
-                  <a:srgbClr val="156D2B"/>
+                  <a:srgbClr val="636363"/>
                 </a:solidFill>
                 <a:latin typeface="Helvetica" pitchFamily="2" charset="0"/>
-              </a:endParaRPr>
-            </a:p>
-            <a:p>
-              <a:endParaRPr lang="en-US" sz="3000" b="1" dirty="0">
-                <a:solidFill>
-                  <a:srgbClr val="156D2B"/>
-                </a:solidFill>
+              </a:rPr>
+              <a:t>Suspension feeders</a:t>
+            </a:r>
+          </a:p>
+        </p:txBody>
+      </p:sp>
+      <p:sp>
+        <p:nvSpPr>
+          <p:cNvPr id="14" name="TextBox 13">
+            <a:extLst>
+              <a:ext uri="{FF2B5EF4-FFF2-40B4-BE49-F238E27FC236}">
+                <a16:creationId xmlns:a16="http://schemas.microsoft.com/office/drawing/2014/main" id="{75A4B9AB-19BE-5246-A652-9AAA880455B7}"/>
+              </a:ext>
+            </a:extLst>
+          </p:cNvPr>
+          <p:cNvSpPr txBox="1"/>
+          <p:nvPr/>
+        </p:nvSpPr>
+        <p:spPr>
+          <a:xfrm>
+            <a:off x="4679326" y="133233"/>
+            <a:ext cx="2922595" cy="707886"/>
+          </a:xfrm>
+          <a:prstGeom prst="rect">
+            <a:avLst/>
+          </a:prstGeom>
+          <a:noFill/>
+        </p:spPr>
+        <p:txBody>
+          <a:bodyPr wrap="none" rtlCol="0">
+            <a:spAutoFit/>
+          </a:bodyPr>
+          <a:lstStyle/>
+          <a:p>
+            <a:r>
+              <a:rPr lang="en-US" sz="4000" u="sng" dirty="0">
                 <a:latin typeface="Helvetica" pitchFamily="2" charset="0"/>
-              </a:endParaRPr>
-            </a:p>
-            <a:p>
-              <a:r>
-                <a:rPr lang="en-US" sz="3000" b="1" dirty="0">
-                  <a:solidFill>
-                    <a:srgbClr val="156D2B"/>
-                  </a:solidFill>
-                  <a:latin typeface="Helvetica" pitchFamily="2" charset="0"/>
-                </a:rPr>
-                <a:t>Leathery macrophytes</a:t>
-              </a:r>
-            </a:p>
-            <a:p>
-              <a:r>
-                <a:rPr lang="en-US" sz="3000" b="1" dirty="0">
-                  <a:solidFill>
-                    <a:srgbClr val="C51A8A"/>
-                  </a:solidFill>
-                  <a:latin typeface="Helvetica" pitchFamily="2" charset="0"/>
-                </a:rPr>
-                <a:t>Articulated corallines</a:t>
-              </a:r>
-            </a:p>
-            <a:p>
-              <a:r>
-                <a:rPr lang="en-US" sz="3000" b="1" dirty="0">
-                  <a:solidFill>
-                    <a:srgbClr val="D4B9DA"/>
-                  </a:solidFill>
-                  <a:latin typeface="Helvetica" pitchFamily="2" charset="0"/>
-                </a:rPr>
-                <a:t>Crustose</a:t>
-              </a:r>
-              <a:endParaRPr lang="en-US" sz="3000" b="1" dirty="0">
-                <a:solidFill>
-                  <a:srgbClr val="156D2B"/>
-                </a:solidFill>
-                <a:latin typeface="Helvetica" pitchFamily="2" charset="0"/>
-              </a:endParaRPr>
-            </a:p>
-            <a:p>
-              <a:r>
-                <a:rPr lang="en-US" sz="3000" b="1" dirty="0">
-                  <a:solidFill>
-                    <a:srgbClr val="54268F"/>
-                  </a:solidFill>
-                  <a:latin typeface="Helvetica" pitchFamily="2" charset="0"/>
-                </a:rPr>
-                <a:t>Anemones</a:t>
-              </a:r>
-            </a:p>
-            <a:p>
-              <a:r>
-                <a:rPr lang="en-US" sz="3000" b="1" dirty="0">
-                  <a:solidFill>
-                    <a:srgbClr val="636363"/>
-                  </a:solidFill>
-                  <a:latin typeface="Helvetica" pitchFamily="2" charset="0"/>
-                </a:rPr>
-                <a:t>Suspension feeders</a:t>
-              </a:r>
-            </a:p>
-          </p:txBody>
-        </p:sp>
-        <p:sp>
-          <p:nvSpPr>
-            <p:cNvPr id="14" name="TextBox 13">
-              <a:extLst>
-                <a:ext uri="{FF2B5EF4-FFF2-40B4-BE49-F238E27FC236}">
-                  <a16:creationId xmlns:a16="http://schemas.microsoft.com/office/drawing/2014/main" id="{75A4B9AB-19BE-5246-A652-9AAA880455B7}"/>
-                </a:ext>
-              </a:extLst>
-            </p:cNvPr>
-            <p:cNvSpPr txBox="1"/>
-            <p:nvPr/>
-          </p:nvSpPr>
-          <p:spPr>
-            <a:xfrm>
-              <a:off x="4679326" y="133233"/>
-              <a:ext cx="2922595" cy="707886"/>
-            </a:xfrm>
-            <a:prstGeom prst="rect">
-              <a:avLst/>
-            </a:prstGeom>
-            <a:noFill/>
-          </p:spPr>
-          <p:txBody>
-            <a:bodyPr wrap="none" rtlCol="0">
-              <a:spAutoFit/>
-            </a:bodyPr>
-            <a:lstStyle/>
-            <a:p>
-              <a:r>
-                <a:rPr lang="en-US" sz="4000" u="sng" dirty="0">
-                  <a:latin typeface="Helvetica" pitchFamily="2" charset="0"/>
-                </a:rPr>
-                <a:t>Shape color</a:t>
-              </a:r>
-            </a:p>
-          </p:txBody>
-        </p:sp>
-      </p:grpSp>
+              </a:rPr>
+              <a:t>Shape color</a:t>
+            </a:r>
+          </a:p>
+        </p:txBody>
+      </p:sp>
     </p:spTree>
     <p:extLst>
       <p:ext uri="{BB962C8B-B14F-4D97-AF65-F5344CB8AC3E}">

</xml_diff>

<commit_message>
ending for the day ttfn
</commit_message>
<xml_diff>
--- a/Output/surfgrasspca.pptx
+++ b/Output/surfgrasspca.pptx
@@ -261,7 +261,7 @@
           <a:p>
             <a:fld id="{CA410B4E-7D17-734D-A9E6-F036B5CECA49}" type="datetimeFigureOut">
               <a:rPr lang="en-US" smtClean="0"/>
-              <a:t>12/25/20</a:t>
+              <a:t>12/27/20</a:t>
             </a:fld>
             <a:endParaRPr lang="en-US"/>
           </a:p>
@@ -459,7 +459,7 @@
           <a:p>
             <a:fld id="{CA410B4E-7D17-734D-A9E6-F036B5CECA49}" type="datetimeFigureOut">
               <a:rPr lang="en-US" smtClean="0"/>
-              <a:t>12/25/20</a:t>
+              <a:t>12/27/20</a:t>
             </a:fld>
             <a:endParaRPr lang="en-US"/>
           </a:p>
@@ -667,7 +667,7 @@
           <a:p>
             <a:fld id="{CA410B4E-7D17-734D-A9E6-F036B5CECA49}" type="datetimeFigureOut">
               <a:rPr lang="en-US" smtClean="0"/>
-              <a:t>12/25/20</a:t>
+              <a:t>12/27/20</a:t>
             </a:fld>
             <a:endParaRPr lang="en-US"/>
           </a:p>
@@ -865,7 +865,7 @@
           <a:p>
             <a:fld id="{CA410B4E-7D17-734D-A9E6-F036B5CECA49}" type="datetimeFigureOut">
               <a:rPr lang="en-US" smtClean="0"/>
-              <a:t>12/25/20</a:t>
+              <a:t>12/27/20</a:t>
             </a:fld>
             <a:endParaRPr lang="en-US"/>
           </a:p>
@@ -1140,7 +1140,7 @@
           <a:p>
             <a:fld id="{CA410B4E-7D17-734D-A9E6-F036B5CECA49}" type="datetimeFigureOut">
               <a:rPr lang="en-US" smtClean="0"/>
-              <a:t>12/25/20</a:t>
+              <a:t>12/27/20</a:t>
             </a:fld>
             <a:endParaRPr lang="en-US"/>
           </a:p>
@@ -1405,7 +1405,7 @@
           <a:p>
             <a:fld id="{CA410B4E-7D17-734D-A9E6-F036B5CECA49}" type="datetimeFigureOut">
               <a:rPr lang="en-US" smtClean="0"/>
-              <a:t>12/25/20</a:t>
+              <a:t>12/27/20</a:t>
             </a:fld>
             <a:endParaRPr lang="en-US"/>
           </a:p>
@@ -1817,7 +1817,7 @@
           <a:p>
             <a:fld id="{CA410B4E-7D17-734D-A9E6-F036B5CECA49}" type="datetimeFigureOut">
               <a:rPr lang="en-US" smtClean="0"/>
-              <a:t>12/25/20</a:t>
+              <a:t>12/27/20</a:t>
             </a:fld>
             <a:endParaRPr lang="en-US"/>
           </a:p>
@@ -1958,7 +1958,7 @@
           <a:p>
             <a:fld id="{CA410B4E-7D17-734D-A9E6-F036B5CECA49}" type="datetimeFigureOut">
               <a:rPr lang="en-US" smtClean="0"/>
-              <a:t>12/25/20</a:t>
+              <a:t>12/27/20</a:t>
             </a:fld>
             <a:endParaRPr lang="en-US"/>
           </a:p>
@@ -2071,7 +2071,7 @@
           <a:p>
             <a:fld id="{CA410B4E-7D17-734D-A9E6-F036B5CECA49}" type="datetimeFigureOut">
               <a:rPr lang="en-US" smtClean="0"/>
-              <a:t>12/25/20</a:t>
+              <a:t>12/27/20</a:t>
             </a:fld>
             <a:endParaRPr lang="en-US"/>
           </a:p>
@@ -2382,7 +2382,7 @@
           <a:p>
             <a:fld id="{CA410B4E-7D17-734D-A9E6-F036B5CECA49}" type="datetimeFigureOut">
               <a:rPr lang="en-US" smtClean="0"/>
-              <a:t>12/25/20</a:t>
+              <a:t>12/27/20</a:t>
             </a:fld>
             <a:endParaRPr lang="en-US"/>
           </a:p>
@@ -2670,7 +2670,7 @@
           <a:p>
             <a:fld id="{CA410B4E-7D17-734D-A9E6-F036B5CECA49}" type="datetimeFigureOut">
               <a:rPr lang="en-US" smtClean="0"/>
-              <a:t>12/25/20</a:t>
+              <a:t>12/27/20</a:t>
             </a:fld>
             <a:endParaRPr lang="en-US"/>
           </a:p>
@@ -2911,7 +2911,7 @@
           <a:p>
             <a:fld id="{CA410B4E-7D17-734D-A9E6-F036B5CECA49}" type="datetimeFigureOut">
               <a:rPr lang="en-US" smtClean="0"/>
-              <a:t>12/25/20</a:t>
+              <a:t>12/27/20</a:t>
             </a:fld>
             <a:endParaRPr lang="en-US"/>
           </a:p>
@@ -5834,6 +5834,42 @@
           </a:p>
         </p:txBody>
       </p:sp>
+      <p:pic>
+        <p:nvPicPr>
+          <p:cNvPr id="3" name="Graphic 2" descr="Thermometer with solid fill">
+            <a:extLst>
+              <a:ext uri="{FF2B5EF4-FFF2-40B4-BE49-F238E27FC236}">
+                <a16:creationId xmlns:a16="http://schemas.microsoft.com/office/drawing/2014/main" id="{BFA66D34-FB5A-024E-BE42-746456F310C5}"/>
+              </a:ext>
+            </a:extLst>
+          </p:cNvPr>
+          <p:cNvPicPr>
+            <a:picLocks noChangeAspect="1"/>
+          </p:cNvPicPr>
+          <p:nvPr/>
+        </p:nvPicPr>
+        <p:blipFill>
+          <a:blip r:embed="rId2">
+            <a:extLst>
+              <a:ext uri="{96DAC541-7B7A-43D3-8B79-37D633B846F1}">
+                <asvg:svgBlip xmlns:asvg="http://schemas.microsoft.com/office/drawing/2016/SVG/main" r:embed="rId3"/>
+              </a:ext>
+            </a:extLst>
+          </a:blip>
+          <a:stretch>
+            <a:fillRect/>
+          </a:stretch>
+        </p:blipFill>
+        <p:spPr>
+          <a:xfrm>
+            <a:off x="4267200" y="4883727"/>
+            <a:ext cx="914400" cy="914400"/>
+          </a:xfrm>
+          <a:prstGeom prst="rect">
+            <a:avLst/>
+          </a:prstGeom>
+        </p:spPr>
+      </p:pic>
     </p:spTree>
     <p:extLst>
       <p:ext uri="{BB962C8B-B14F-4D97-AF65-F5344CB8AC3E}">

</xml_diff>

<commit_message>
finished oceanographic buoy summary of ocean temps
</commit_message>
<xml_diff>
--- a/Output/surfgrasspca.pptx
+++ b/Output/surfgrasspca.pptx
@@ -261,7 +261,7 @@
           <a:p>
             <a:fld id="{CA410B4E-7D17-734D-A9E6-F036B5CECA49}" type="datetimeFigureOut">
               <a:rPr lang="en-US" smtClean="0"/>
-              <a:t>12/27/20</a:t>
+              <a:t>1/26/21</a:t>
             </a:fld>
             <a:endParaRPr lang="en-US"/>
           </a:p>
@@ -459,7 +459,7 @@
           <a:p>
             <a:fld id="{CA410B4E-7D17-734D-A9E6-F036B5CECA49}" type="datetimeFigureOut">
               <a:rPr lang="en-US" smtClean="0"/>
-              <a:t>12/27/20</a:t>
+              <a:t>1/26/21</a:t>
             </a:fld>
             <a:endParaRPr lang="en-US"/>
           </a:p>
@@ -667,7 +667,7 @@
           <a:p>
             <a:fld id="{CA410B4E-7D17-734D-A9E6-F036B5CECA49}" type="datetimeFigureOut">
               <a:rPr lang="en-US" smtClean="0"/>
-              <a:t>12/27/20</a:t>
+              <a:t>1/26/21</a:t>
             </a:fld>
             <a:endParaRPr lang="en-US"/>
           </a:p>
@@ -865,7 +865,7 @@
           <a:p>
             <a:fld id="{CA410B4E-7D17-734D-A9E6-F036B5CECA49}" type="datetimeFigureOut">
               <a:rPr lang="en-US" smtClean="0"/>
-              <a:t>12/27/20</a:t>
+              <a:t>1/26/21</a:t>
             </a:fld>
             <a:endParaRPr lang="en-US"/>
           </a:p>
@@ -1140,7 +1140,7 @@
           <a:p>
             <a:fld id="{CA410B4E-7D17-734D-A9E6-F036B5CECA49}" type="datetimeFigureOut">
               <a:rPr lang="en-US" smtClean="0"/>
-              <a:t>12/27/20</a:t>
+              <a:t>1/26/21</a:t>
             </a:fld>
             <a:endParaRPr lang="en-US"/>
           </a:p>
@@ -1405,7 +1405,7 @@
           <a:p>
             <a:fld id="{CA410B4E-7D17-734D-A9E6-F036B5CECA49}" type="datetimeFigureOut">
               <a:rPr lang="en-US" smtClean="0"/>
-              <a:t>12/27/20</a:t>
+              <a:t>1/26/21</a:t>
             </a:fld>
             <a:endParaRPr lang="en-US"/>
           </a:p>
@@ -1817,7 +1817,7 @@
           <a:p>
             <a:fld id="{CA410B4E-7D17-734D-A9E6-F036B5CECA49}" type="datetimeFigureOut">
               <a:rPr lang="en-US" smtClean="0"/>
-              <a:t>12/27/20</a:t>
+              <a:t>1/26/21</a:t>
             </a:fld>
             <a:endParaRPr lang="en-US"/>
           </a:p>
@@ -1958,7 +1958,7 @@
           <a:p>
             <a:fld id="{CA410B4E-7D17-734D-A9E6-F036B5CECA49}" type="datetimeFigureOut">
               <a:rPr lang="en-US" smtClean="0"/>
-              <a:t>12/27/20</a:t>
+              <a:t>1/26/21</a:t>
             </a:fld>
             <a:endParaRPr lang="en-US"/>
           </a:p>
@@ -2071,7 +2071,7 @@
           <a:p>
             <a:fld id="{CA410B4E-7D17-734D-A9E6-F036B5CECA49}" type="datetimeFigureOut">
               <a:rPr lang="en-US" smtClean="0"/>
-              <a:t>12/27/20</a:t>
+              <a:t>1/26/21</a:t>
             </a:fld>
             <a:endParaRPr lang="en-US"/>
           </a:p>
@@ -2382,7 +2382,7 @@
           <a:p>
             <a:fld id="{CA410B4E-7D17-734D-A9E6-F036B5CECA49}" type="datetimeFigureOut">
               <a:rPr lang="en-US" smtClean="0"/>
-              <a:t>12/27/20</a:t>
+              <a:t>1/26/21</a:t>
             </a:fld>
             <a:endParaRPr lang="en-US"/>
           </a:p>
@@ -2670,7 +2670,7 @@
           <a:p>
             <a:fld id="{CA410B4E-7D17-734D-A9E6-F036B5CECA49}" type="datetimeFigureOut">
               <a:rPr lang="en-US" smtClean="0"/>
-              <a:t>12/27/20</a:t>
+              <a:t>1/26/21</a:t>
             </a:fld>
             <a:endParaRPr lang="en-US"/>
           </a:p>
@@ -2911,7 +2911,7 @@
           <a:p>
             <a:fld id="{CA410B4E-7D17-734D-A9E6-F036B5CECA49}" type="datetimeFigureOut">
               <a:rPr lang="en-US" smtClean="0"/>
-              <a:t>12/27/20</a:t>
+              <a:t>1/26/21</a:t>
             </a:fld>
             <a:endParaRPr lang="en-US"/>
           </a:p>
@@ -5870,6 +5870,414 @@
           </a:prstGeom>
         </p:spPr>
       </p:pic>
+      <p:cxnSp>
+        <p:nvCxnSpPr>
+          <p:cNvPr id="5" name="Straight Arrow Connector 4">
+            <a:extLst>
+              <a:ext uri="{FF2B5EF4-FFF2-40B4-BE49-F238E27FC236}">
+                <a16:creationId xmlns:a16="http://schemas.microsoft.com/office/drawing/2014/main" id="{AFF9D924-C9BE-ED4E-8E6C-C37391AB0E31}"/>
+              </a:ext>
+            </a:extLst>
+          </p:cNvPr>
+          <p:cNvCxnSpPr>
+            <a:cxnSpLocks/>
+          </p:cNvCxnSpPr>
+          <p:nvPr/>
+        </p:nvCxnSpPr>
+        <p:spPr>
+          <a:xfrm flipV="1">
+            <a:off x="11125201" y="3585648"/>
+            <a:ext cx="0" cy="1755279"/>
+          </a:xfrm>
+          <a:prstGeom prst="straightConnector1">
+            <a:avLst/>
+          </a:prstGeom>
+          <a:ln w="50800">
+            <a:solidFill>
+              <a:schemeClr val="tx1"/>
+            </a:solidFill>
+            <a:tailEnd type="triangle"/>
+          </a:ln>
+        </p:spPr>
+        <p:style>
+          <a:lnRef idx="1">
+            <a:schemeClr val="accent1"/>
+          </a:lnRef>
+          <a:fillRef idx="0">
+            <a:schemeClr val="accent1"/>
+          </a:fillRef>
+          <a:effectRef idx="0">
+            <a:schemeClr val="accent1"/>
+          </a:effectRef>
+          <a:fontRef idx="minor">
+            <a:schemeClr val="tx1"/>
+          </a:fontRef>
+        </p:style>
+      </p:cxnSp>
+      <p:sp>
+        <p:nvSpPr>
+          <p:cNvPr id="6" name="Rectangle 5">
+            <a:extLst>
+              <a:ext uri="{FF2B5EF4-FFF2-40B4-BE49-F238E27FC236}">
+                <a16:creationId xmlns:a16="http://schemas.microsoft.com/office/drawing/2014/main" id="{DB6AEAE2-5BDB-DF47-A2E5-2D4073565349}"/>
+              </a:ext>
+            </a:extLst>
+          </p:cNvPr>
+          <p:cNvSpPr/>
+          <p:nvPr/>
+        </p:nvSpPr>
+        <p:spPr>
+          <a:xfrm>
+            <a:off x="9812423" y="2305275"/>
+            <a:ext cx="2625556" cy="1323439"/>
+          </a:xfrm>
+          <a:prstGeom prst="rect">
+            <a:avLst/>
+          </a:prstGeom>
+          <a:noFill/>
+        </p:spPr>
+        <p:txBody>
+          <a:bodyPr wrap="square" lIns="91440" tIns="45720" rIns="91440" bIns="45720">
+            <a:spAutoFit/>
+          </a:bodyPr>
+          <a:lstStyle/>
+          <a:p>
+            <a:pPr algn="ctr"/>
+            <a:r>
+              <a:rPr lang="en-US" sz="4000" b="1" cap="none" spc="0" dirty="0">
+                <a:ln w="10160">
+                  <a:solidFill>
+                    <a:schemeClr val="tx1"/>
+                  </a:solidFill>
+                  <a:prstDash val="solid"/>
+                </a:ln>
+                <a:noFill/>
+                <a:latin typeface="Helvetica" pitchFamily="2" charset="0"/>
+              </a:rPr>
+              <a:t>After Removal</a:t>
+            </a:r>
+            <a:endParaRPr lang="en-US" sz="4000" b="1" cap="none" spc="0" dirty="0">
+              <a:ln w="10160">
+                <a:solidFill>
+                  <a:schemeClr val="tx1"/>
+                </a:solidFill>
+                <a:prstDash val="solid"/>
+              </a:ln>
+              <a:noFill/>
+            </a:endParaRPr>
+          </a:p>
+        </p:txBody>
+      </p:sp>
+      <p:sp>
+        <p:nvSpPr>
+          <p:cNvPr id="7" name="TextBox 6">
+            <a:extLst>
+              <a:ext uri="{FF2B5EF4-FFF2-40B4-BE49-F238E27FC236}">
+                <a16:creationId xmlns:a16="http://schemas.microsoft.com/office/drawing/2014/main" id="{FB42DD2B-7AC0-6746-BE58-56FEEE5D86A3}"/>
+              </a:ext>
+            </a:extLst>
+          </p:cNvPr>
+          <p:cNvSpPr txBox="1"/>
+          <p:nvPr/>
+        </p:nvSpPr>
+        <p:spPr>
+          <a:xfrm>
+            <a:off x="10220145" y="5340927"/>
+            <a:ext cx="1810112" cy="707886"/>
+          </a:xfrm>
+          <a:prstGeom prst="rect">
+            <a:avLst/>
+          </a:prstGeom>
+          <a:noFill/>
+        </p:spPr>
+        <p:txBody>
+          <a:bodyPr wrap="none" rtlCol="0">
+            <a:spAutoFit/>
+          </a:bodyPr>
+          <a:lstStyle/>
+          <a:p>
+            <a:pPr algn="ctr"/>
+            <a:r>
+              <a:rPr lang="en-US" sz="4000" b="1" dirty="0">
+                <a:latin typeface="Helvetica" pitchFamily="2" charset="0"/>
+              </a:rPr>
+              <a:t>Before</a:t>
+            </a:r>
+          </a:p>
+        </p:txBody>
+      </p:sp>
+      <p:sp>
+        <p:nvSpPr>
+          <p:cNvPr id="8" name="Rectangle 7">
+            <a:extLst>
+              <a:ext uri="{FF2B5EF4-FFF2-40B4-BE49-F238E27FC236}">
+                <a16:creationId xmlns:a16="http://schemas.microsoft.com/office/drawing/2014/main" id="{6B08D310-D263-424B-98D9-9CC29953207A}"/>
+              </a:ext>
+            </a:extLst>
+          </p:cNvPr>
+          <p:cNvSpPr/>
+          <p:nvPr/>
+        </p:nvSpPr>
+        <p:spPr>
+          <a:xfrm>
+            <a:off x="557812" y="3628714"/>
+            <a:ext cx="2625556" cy="1323439"/>
+          </a:xfrm>
+          <a:prstGeom prst="rect">
+            <a:avLst/>
+          </a:prstGeom>
+          <a:noFill/>
+        </p:spPr>
+        <p:txBody>
+          <a:bodyPr wrap="square" lIns="91440" tIns="45720" rIns="91440" bIns="45720">
+            <a:spAutoFit/>
+          </a:bodyPr>
+          <a:lstStyle/>
+          <a:p>
+            <a:pPr algn="ctr"/>
+            <a:r>
+              <a:rPr lang="en-US" sz="4000" b="1" cap="none" spc="0" dirty="0">
+                <a:ln w="10160">
+                  <a:solidFill>
+                    <a:schemeClr val="tx1"/>
+                  </a:solidFill>
+                  <a:prstDash val="solid"/>
+                </a:ln>
+                <a:noFill/>
+                <a:latin typeface="Helvetica" pitchFamily="2" charset="0"/>
+              </a:rPr>
+              <a:t>After Removal</a:t>
+            </a:r>
+            <a:endParaRPr lang="en-US" sz="4000" b="1" cap="none" spc="0" dirty="0">
+              <a:ln w="10160">
+                <a:solidFill>
+                  <a:schemeClr val="tx1"/>
+                </a:solidFill>
+                <a:prstDash val="solid"/>
+              </a:ln>
+              <a:noFill/>
+            </a:endParaRPr>
+          </a:p>
+        </p:txBody>
+      </p:sp>
+      <p:cxnSp>
+        <p:nvCxnSpPr>
+          <p:cNvPr id="9" name="Straight Arrow Connector 8">
+            <a:extLst>
+              <a:ext uri="{FF2B5EF4-FFF2-40B4-BE49-F238E27FC236}">
+                <a16:creationId xmlns:a16="http://schemas.microsoft.com/office/drawing/2014/main" id="{049F5C55-AF4F-F041-B384-4B7AE26EFEFB}"/>
+              </a:ext>
+            </a:extLst>
+          </p:cNvPr>
+          <p:cNvCxnSpPr>
+            <a:cxnSpLocks/>
+          </p:cNvCxnSpPr>
+          <p:nvPr/>
+        </p:nvCxnSpPr>
+        <p:spPr>
+          <a:xfrm flipH="1">
+            <a:off x="3183368" y="4379704"/>
+            <a:ext cx="2167663" cy="0"/>
+          </a:xfrm>
+          <a:prstGeom prst="straightConnector1">
+            <a:avLst/>
+          </a:prstGeom>
+          <a:ln w="50800">
+            <a:solidFill>
+              <a:schemeClr val="tx1"/>
+            </a:solidFill>
+            <a:tailEnd type="triangle"/>
+          </a:ln>
+        </p:spPr>
+        <p:style>
+          <a:lnRef idx="1">
+            <a:schemeClr val="accent1"/>
+          </a:lnRef>
+          <a:fillRef idx="0">
+            <a:schemeClr val="accent1"/>
+          </a:fillRef>
+          <a:effectRef idx="0">
+            <a:schemeClr val="accent1"/>
+          </a:effectRef>
+          <a:fontRef idx="minor">
+            <a:schemeClr val="tx1"/>
+          </a:fontRef>
+        </p:style>
+      </p:cxnSp>
+      <p:sp>
+        <p:nvSpPr>
+          <p:cNvPr id="13" name="TextBox 12">
+            <a:extLst>
+              <a:ext uri="{FF2B5EF4-FFF2-40B4-BE49-F238E27FC236}">
+                <a16:creationId xmlns:a16="http://schemas.microsoft.com/office/drawing/2014/main" id="{C9B82F56-AD65-B847-9BD8-99F63C7B7534}"/>
+              </a:ext>
+            </a:extLst>
+          </p:cNvPr>
+          <p:cNvSpPr txBox="1"/>
+          <p:nvPr/>
+        </p:nvSpPr>
+        <p:spPr>
+          <a:xfrm>
+            <a:off x="5351031" y="4025761"/>
+            <a:ext cx="1810112" cy="707886"/>
+          </a:xfrm>
+          <a:prstGeom prst="rect">
+            <a:avLst/>
+          </a:prstGeom>
+          <a:noFill/>
+        </p:spPr>
+        <p:txBody>
+          <a:bodyPr wrap="none" rtlCol="0">
+            <a:spAutoFit/>
+          </a:bodyPr>
+          <a:lstStyle/>
+          <a:p>
+            <a:pPr algn="ctr"/>
+            <a:r>
+              <a:rPr lang="en-US" sz="4000" b="1" dirty="0">
+                <a:latin typeface="Helvetica" pitchFamily="2" charset="0"/>
+              </a:rPr>
+              <a:t>Before</a:t>
+            </a:r>
+          </a:p>
+        </p:txBody>
+      </p:sp>
+      <p:sp>
+        <p:nvSpPr>
+          <p:cNvPr id="16" name="TextBox 15">
+            <a:extLst>
+              <a:ext uri="{FF2B5EF4-FFF2-40B4-BE49-F238E27FC236}">
+                <a16:creationId xmlns:a16="http://schemas.microsoft.com/office/drawing/2014/main" id="{06317D69-2C59-634B-B83E-0E2C6EDB7189}"/>
+              </a:ext>
+            </a:extLst>
+          </p:cNvPr>
+          <p:cNvSpPr txBox="1"/>
+          <p:nvPr/>
+        </p:nvSpPr>
+        <p:spPr>
+          <a:xfrm>
+            <a:off x="968753" y="5791185"/>
+            <a:ext cx="1810112" cy="707886"/>
+          </a:xfrm>
+          <a:prstGeom prst="rect">
+            <a:avLst/>
+          </a:prstGeom>
+          <a:noFill/>
+        </p:spPr>
+        <p:txBody>
+          <a:bodyPr wrap="none" rtlCol="0">
+            <a:spAutoFit/>
+          </a:bodyPr>
+          <a:lstStyle/>
+          <a:p>
+            <a:pPr algn="ctr"/>
+            <a:r>
+              <a:rPr lang="en-US" sz="4000" b="1" dirty="0">
+                <a:latin typeface="Helvetica" pitchFamily="2" charset="0"/>
+              </a:rPr>
+              <a:t>Before</a:t>
+            </a:r>
+          </a:p>
+        </p:txBody>
+      </p:sp>
+      <p:cxnSp>
+        <p:nvCxnSpPr>
+          <p:cNvPr id="17" name="Straight Arrow Connector 16">
+            <a:extLst>
+              <a:ext uri="{FF2B5EF4-FFF2-40B4-BE49-F238E27FC236}">
+                <a16:creationId xmlns:a16="http://schemas.microsoft.com/office/drawing/2014/main" id="{737671D4-B127-4A44-B0DA-D8B751A9A04E}"/>
+              </a:ext>
+            </a:extLst>
+          </p:cNvPr>
+          <p:cNvCxnSpPr>
+            <a:cxnSpLocks/>
+          </p:cNvCxnSpPr>
+          <p:nvPr/>
+        </p:nvCxnSpPr>
+        <p:spPr>
+          <a:xfrm>
+            <a:off x="2775646" y="6168211"/>
+            <a:ext cx="2108034" cy="0"/>
+          </a:xfrm>
+          <a:prstGeom prst="straightConnector1">
+            <a:avLst/>
+          </a:prstGeom>
+          <a:ln w="50800">
+            <a:solidFill>
+              <a:schemeClr val="tx1"/>
+            </a:solidFill>
+            <a:tailEnd type="triangle"/>
+          </a:ln>
+        </p:spPr>
+        <p:style>
+          <a:lnRef idx="1">
+            <a:schemeClr val="accent1"/>
+          </a:lnRef>
+          <a:fillRef idx="0">
+            <a:schemeClr val="accent1"/>
+          </a:fillRef>
+          <a:effectRef idx="0">
+            <a:schemeClr val="accent1"/>
+          </a:effectRef>
+          <a:fontRef idx="minor">
+            <a:schemeClr val="tx1"/>
+          </a:fontRef>
+        </p:style>
+      </p:cxnSp>
+      <p:sp>
+        <p:nvSpPr>
+          <p:cNvPr id="20" name="Rectangle 19">
+            <a:extLst>
+              <a:ext uri="{FF2B5EF4-FFF2-40B4-BE49-F238E27FC236}">
+                <a16:creationId xmlns:a16="http://schemas.microsoft.com/office/drawing/2014/main" id="{D949724A-47AC-A148-A624-69205EF35573}"/>
+              </a:ext>
+            </a:extLst>
+          </p:cNvPr>
+          <p:cNvSpPr/>
+          <p:nvPr/>
+        </p:nvSpPr>
+        <p:spPr>
+          <a:xfrm>
+            <a:off x="4883680" y="5506492"/>
+            <a:ext cx="2625556" cy="1323439"/>
+          </a:xfrm>
+          <a:prstGeom prst="rect">
+            <a:avLst/>
+          </a:prstGeom>
+          <a:noFill/>
+        </p:spPr>
+        <p:txBody>
+          <a:bodyPr wrap="square" lIns="91440" tIns="45720" rIns="91440" bIns="45720">
+            <a:spAutoFit/>
+          </a:bodyPr>
+          <a:lstStyle/>
+          <a:p>
+            <a:pPr algn="ctr"/>
+            <a:r>
+              <a:rPr lang="en-US" sz="4000" b="1" cap="none" spc="0" dirty="0">
+                <a:ln w="10160">
+                  <a:solidFill>
+                    <a:schemeClr val="tx1"/>
+                  </a:solidFill>
+                  <a:prstDash val="solid"/>
+                </a:ln>
+                <a:noFill/>
+                <a:latin typeface="Helvetica" pitchFamily="2" charset="0"/>
+              </a:rPr>
+              <a:t>After Removal</a:t>
+            </a:r>
+            <a:endParaRPr lang="en-US" sz="4000" b="1" cap="none" spc="0" dirty="0">
+              <a:ln w="10160">
+                <a:solidFill>
+                  <a:schemeClr val="tx1"/>
+                </a:solidFill>
+                <a:prstDash val="solid"/>
+              </a:ln>
+              <a:noFill/>
+            </a:endParaRPr>
+          </a:p>
+        </p:txBody>
+      </p:sp>
     </p:spTree>
     <p:extLst>
       <p:ext uri="{BB962C8B-B14F-4D97-AF65-F5344CB8AC3E}">

</xml_diff>